<commit_message>
Change some chinese characters
</commit_message>
<xml_diff>
--- a/崇拜流程.pptx
+++ b/崇拜流程.pptx
@@ -133,13 +133,18 @@
   </p:defaultTextStyle>
   <p:extLst>
     <p:ext uri="{EFAFB233-063F-42B5-8137-9DF3F51BA10A}">
-      <p15:sldGuideLst xmlns="" xmlns:p15="http://schemas.microsoft.com/office/powerpoint/2012/main">
+      <p15:sldGuideLst xmlns:p15="http://schemas.microsoft.com/office/powerpoint/2012/main">
         <p15:guide id="1" orient="horz" pos="2160">
           <p15:clr>
             <a:srgbClr val="A4A3A4"/>
           </p15:clr>
         </p15:guide>
         <p15:guide id="2" pos="2880">
+          <p15:clr>
+            <a:srgbClr val="A4A3A4"/>
+          </p15:clr>
+        </p15:guide>
+        <p15:guide id="3" orient="horz" pos="1620">
           <p15:clr>
             <a:srgbClr val="A4A3A4"/>
           </p15:clr>
@@ -233,7 +238,7 @@
             <a:fld id="{2F30D4D0-EAC7-4980-A92D-C26C9148BA0F}" type="datetimeFigureOut">
               <a:rPr lang="zh-TW" altLang="en-US" smtClean="0"/>
               <a:pPr/>
-              <a:t>2019/9/20</a:t>
+              <a:t>2020/1/18</a:t>
             </a:fld>
             <a:endParaRPr lang="zh-TW" altLang="en-US"/>
           </a:p>
@@ -1126,7 +1131,7 @@
             <a:fld id="{5BBEAD13-0566-4C6C-97E7-55F17F24B09F}" type="datetimeFigureOut">
               <a:rPr lang="zh-TW" altLang="en-US" smtClean="0"/>
               <a:pPr/>
-              <a:t>2019/9/20</a:t>
+              <a:t>2020/1/18</a:t>
             </a:fld>
             <a:endParaRPr lang="zh-TW" altLang="en-US"/>
           </a:p>
@@ -1293,7 +1298,7 @@
             <a:fld id="{5BBEAD13-0566-4C6C-97E7-55F17F24B09F}" type="datetimeFigureOut">
               <a:rPr lang="zh-TW" altLang="en-US" smtClean="0"/>
               <a:pPr/>
-              <a:t>2019/9/20</a:t>
+              <a:t>2020/1/18</a:t>
             </a:fld>
             <a:endParaRPr lang="zh-TW" altLang="en-US"/>
           </a:p>
@@ -1470,7 +1475,7 @@
             <a:fld id="{5BBEAD13-0566-4C6C-97E7-55F17F24B09F}" type="datetimeFigureOut">
               <a:rPr lang="zh-TW" altLang="en-US" smtClean="0"/>
               <a:pPr/>
-              <a:t>2019/9/20</a:t>
+              <a:t>2020/1/18</a:t>
             </a:fld>
             <a:endParaRPr lang="zh-TW" altLang="en-US"/>
           </a:p>
@@ -1637,7 +1642,7 @@
             <a:fld id="{5BBEAD13-0566-4C6C-97E7-55F17F24B09F}" type="datetimeFigureOut">
               <a:rPr lang="zh-TW" altLang="en-US" smtClean="0"/>
               <a:pPr/>
-              <a:t>2019/9/20</a:t>
+              <a:t>2020/1/18</a:t>
             </a:fld>
             <a:endParaRPr lang="zh-TW" altLang="en-US"/>
           </a:p>
@@ -1880,7 +1885,7 @@
             <a:fld id="{5BBEAD13-0566-4C6C-97E7-55F17F24B09F}" type="datetimeFigureOut">
               <a:rPr lang="zh-TW" altLang="en-US" smtClean="0"/>
               <a:pPr/>
-              <a:t>2019/9/20</a:t>
+              <a:t>2020/1/18</a:t>
             </a:fld>
             <a:endParaRPr lang="zh-TW" altLang="en-US"/>
           </a:p>
@@ -2165,7 +2170,7 @@
             <a:fld id="{5BBEAD13-0566-4C6C-97E7-55F17F24B09F}" type="datetimeFigureOut">
               <a:rPr lang="zh-TW" altLang="en-US" smtClean="0"/>
               <a:pPr/>
-              <a:t>2019/9/20</a:t>
+              <a:t>2020/1/18</a:t>
             </a:fld>
             <a:endParaRPr lang="zh-TW" altLang="en-US"/>
           </a:p>
@@ -2584,7 +2589,7 @@
             <a:fld id="{5BBEAD13-0566-4C6C-97E7-55F17F24B09F}" type="datetimeFigureOut">
               <a:rPr lang="zh-TW" altLang="en-US" smtClean="0"/>
               <a:pPr/>
-              <a:t>2019/9/20</a:t>
+              <a:t>2020/1/18</a:t>
             </a:fld>
             <a:endParaRPr lang="zh-TW" altLang="en-US"/>
           </a:p>
@@ -2699,7 +2704,7 @@
             <a:fld id="{5BBEAD13-0566-4C6C-97E7-55F17F24B09F}" type="datetimeFigureOut">
               <a:rPr lang="zh-TW" altLang="en-US" smtClean="0"/>
               <a:pPr/>
-              <a:t>2019/9/20</a:t>
+              <a:t>2020/1/18</a:t>
             </a:fld>
             <a:endParaRPr lang="zh-TW" altLang="en-US"/>
           </a:p>
@@ -2791,7 +2796,7 @@
             <a:fld id="{5BBEAD13-0566-4C6C-97E7-55F17F24B09F}" type="datetimeFigureOut">
               <a:rPr lang="zh-TW" altLang="en-US" smtClean="0"/>
               <a:pPr/>
-              <a:t>2019/9/20</a:t>
+              <a:t>2020/1/18</a:t>
             </a:fld>
             <a:endParaRPr lang="zh-TW" altLang="en-US"/>
           </a:p>
@@ -3065,7 +3070,7 @@
             <a:fld id="{5BBEAD13-0566-4C6C-97E7-55F17F24B09F}" type="datetimeFigureOut">
               <a:rPr lang="zh-TW" altLang="en-US" smtClean="0"/>
               <a:pPr/>
-              <a:t>2019/9/20</a:t>
+              <a:t>2020/1/18</a:t>
             </a:fld>
             <a:endParaRPr lang="zh-TW" altLang="en-US"/>
           </a:p>
@@ -3319,7 +3324,7 @@
             <a:fld id="{5BBEAD13-0566-4C6C-97E7-55F17F24B09F}" type="datetimeFigureOut">
               <a:rPr lang="zh-TW" altLang="en-US" smtClean="0"/>
               <a:pPr/>
-              <a:t>2019/9/20</a:t>
+              <a:t>2020/1/18</a:t>
             </a:fld>
             <a:endParaRPr lang="zh-TW" altLang="en-US"/>
           </a:p>
@@ -3534,7 +3539,7 @@
             <a:fld id="{5BBEAD13-0566-4C6C-97E7-55F17F24B09F}" type="datetimeFigureOut">
               <a:rPr lang="zh-TW" altLang="en-US" smtClean="0"/>
               <a:pPr/>
-              <a:t>2019/9/20</a:t>
+              <a:t>2020/1/18</a:t>
             </a:fld>
             <a:endParaRPr lang="zh-TW" altLang="en-US"/>
           </a:p>
@@ -5259,7 +5264,41 @@
                 <a:latin typeface="微軟正黑體" pitchFamily="34" charset="-120"/>
                 <a:ea typeface="微軟正黑體" pitchFamily="34" charset="-120"/>
               </a:rPr>
-              <a:t>願人都尊袮的名為聖</a:t>
+              <a:t>願人都</a:t>
+            </a:r>
+            <a:r>
+              <a:rPr lang="zh-CN" altLang="en-US" sz="4800" b="1" dirty="0">
+                <a:solidFill>
+                  <a:srgbClr val="000066"/>
+                </a:solidFill>
+                <a:effectLst>
+                  <a:outerShdw blurRad="50000" dist="30000" dir="5400000" algn="tl" rotWithShape="0">
+                    <a:srgbClr val="000000">
+                      <a:alpha val="30000"/>
+                    </a:srgbClr>
+                  </a:outerShdw>
+                </a:effectLst>
+                <a:latin typeface="微軟正黑體" pitchFamily="34" charset="-120"/>
+                <a:ea typeface="微軟正黑體" pitchFamily="34" charset="-120"/>
+              </a:rPr>
+              <a:t>尊父的</a:t>
+            </a:r>
+            <a:r>
+              <a:rPr lang="zh-CN" altLang="en-US" sz="4800" b="1" dirty="0" smtClean="0">
+                <a:solidFill>
+                  <a:srgbClr val="000066"/>
+                </a:solidFill>
+                <a:effectLst>
+                  <a:outerShdw blurRad="50000" dist="30000" dir="5400000" algn="tl" rotWithShape="0">
+                    <a:srgbClr val="000000">
+                      <a:alpha val="30000"/>
+                    </a:srgbClr>
+                  </a:outerShdw>
+                </a:effectLst>
+                <a:latin typeface="微軟正黑體" pitchFamily="34" charset="-120"/>
+                <a:ea typeface="微軟正黑體" pitchFamily="34" charset="-120"/>
+              </a:rPr>
+              <a:t>名為聖</a:t>
             </a:r>
             <a:endParaRPr lang="en-US" altLang="zh-CN" sz="4800" b="1" dirty="0" smtClean="0">
               <a:solidFill>

</xml_diff>